<commit_message>
Reorganising and unifying the rules. New rule for brown at 4 points.
</commit_message>
<xml_diff>
--- a/doc/rules.pptx
+++ b/doc/rules.pptx
@@ -104,6 +104,11 @@
       </a:defRPr>
     </a:lvl9pPr>
   </p:defaultTextStyle>
+  <p:extLst>
+    <p:ext uri="{EFAFB233-063F-42B5-8137-9DF3F51BA10A}">
+      <p15:sldGuideLst xmlns:p15="http://schemas.microsoft.com/office/powerpoint/2012/main"/>
+    </p:ext>
+  </p:extLst>
 </p:presentation>
 </file>
 
@@ -254,7 +259,7 @@
           <a:p>
             <a:fld id="{D04E3B3A-2E78-DB49-AE97-5814CF311F16}" type="datetimeFigureOut">
               <a:rPr lang="en-GB" smtClean="0"/>
-              <a:t>11/03/2021</a:t>
+              <a:t>05/07/2021</a:t>
             </a:fld>
             <a:endParaRPr lang="en-GB"/>
           </a:p>
@@ -452,7 +457,7 @@
           <a:p>
             <a:fld id="{D04E3B3A-2E78-DB49-AE97-5814CF311F16}" type="datetimeFigureOut">
               <a:rPr lang="en-GB" smtClean="0"/>
-              <a:t>11/03/2021</a:t>
+              <a:t>05/07/2021</a:t>
             </a:fld>
             <a:endParaRPr lang="en-GB"/>
           </a:p>
@@ -660,7 +665,7 @@
           <a:p>
             <a:fld id="{D04E3B3A-2E78-DB49-AE97-5814CF311F16}" type="datetimeFigureOut">
               <a:rPr lang="en-GB" smtClean="0"/>
-              <a:t>11/03/2021</a:t>
+              <a:t>05/07/2021</a:t>
             </a:fld>
             <a:endParaRPr lang="en-GB"/>
           </a:p>
@@ -858,7 +863,7 @@
           <a:p>
             <a:fld id="{D04E3B3A-2E78-DB49-AE97-5814CF311F16}" type="datetimeFigureOut">
               <a:rPr lang="en-GB" smtClean="0"/>
-              <a:t>11/03/2021</a:t>
+              <a:t>05/07/2021</a:t>
             </a:fld>
             <a:endParaRPr lang="en-GB"/>
           </a:p>
@@ -1133,7 +1138,7 @@
           <a:p>
             <a:fld id="{D04E3B3A-2E78-DB49-AE97-5814CF311F16}" type="datetimeFigureOut">
               <a:rPr lang="en-GB" smtClean="0"/>
-              <a:t>11/03/2021</a:t>
+              <a:t>05/07/2021</a:t>
             </a:fld>
             <a:endParaRPr lang="en-GB"/>
           </a:p>
@@ -1398,7 +1403,7 @@
           <a:p>
             <a:fld id="{D04E3B3A-2E78-DB49-AE97-5814CF311F16}" type="datetimeFigureOut">
               <a:rPr lang="en-GB" smtClean="0"/>
-              <a:t>11/03/2021</a:t>
+              <a:t>05/07/2021</a:t>
             </a:fld>
             <a:endParaRPr lang="en-GB"/>
           </a:p>
@@ -1810,7 +1815,7 @@
           <a:p>
             <a:fld id="{D04E3B3A-2E78-DB49-AE97-5814CF311F16}" type="datetimeFigureOut">
               <a:rPr lang="en-GB" smtClean="0"/>
-              <a:t>11/03/2021</a:t>
+              <a:t>05/07/2021</a:t>
             </a:fld>
             <a:endParaRPr lang="en-GB"/>
           </a:p>
@@ -1951,7 +1956,7 @@
           <a:p>
             <a:fld id="{D04E3B3A-2E78-DB49-AE97-5814CF311F16}" type="datetimeFigureOut">
               <a:rPr lang="en-GB" smtClean="0"/>
-              <a:t>11/03/2021</a:t>
+              <a:t>05/07/2021</a:t>
             </a:fld>
             <a:endParaRPr lang="en-GB"/>
           </a:p>
@@ -2064,7 +2069,7 @@
           <a:p>
             <a:fld id="{D04E3B3A-2E78-DB49-AE97-5814CF311F16}" type="datetimeFigureOut">
               <a:rPr lang="en-GB" smtClean="0"/>
-              <a:t>11/03/2021</a:t>
+              <a:t>05/07/2021</a:t>
             </a:fld>
             <a:endParaRPr lang="en-GB"/>
           </a:p>
@@ -2375,7 +2380,7 @@
           <a:p>
             <a:fld id="{D04E3B3A-2E78-DB49-AE97-5814CF311F16}" type="datetimeFigureOut">
               <a:rPr lang="en-GB" smtClean="0"/>
-              <a:t>11/03/2021</a:t>
+              <a:t>05/07/2021</a:t>
             </a:fld>
             <a:endParaRPr lang="en-GB"/>
           </a:p>
@@ -2663,7 +2668,7 @@
           <a:p>
             <a:fld id="{D04E3B3A-2E78-DB49-AE97-5814CF311F16}" type="datetimeFigureOut">
               <a:rPr lang="en-GB" smtClean="0"/>
-              <a:t>11/03/2021</a:t>
+              <a:t>05/07/2021</a:t>
             </a:fld>
             <a:endParaRPr lang="en-GB"/>
           </a:p>
@@ -2904,7 +2909,7 @@
           <a:p>
             <a:fld id="{D04E3B3A-2E78-DB49-AE97-5814CF311F16}" type="datetimeFigureOut">
               <a:rPr lang="en-GB" smtClean="0"/>
-              <a:t>11/03/2021</a:t>
+              <a:t>05/07/2021</a:t>
             </a:fld>
             <a:endParaRPr lang="en-GB"/>
           </a:p>
@@ -4721,185 +4726,939 @@
           </p:txBody>
         </p:sp>
       </p:grpSp>
-      <p:sp>
-        <p:nvSpPr>
-          <p:cNvPr id="46" name="TextBox 45">
-            <a:extLst>
-              <a:ext uri="{FF2B5EF4-FFF2-40B4-BE49-F238E27FC236}">
-                <a16:creationId xmlns:a16="http://schemas.microsoft.com/office/drawing/2014/main" id="{D33F25A0-9441-5044-B8B5-2CD31D5A6D5B}"/>
-              </a:ext>
-            </a:extLst>
-          </p:cNvPr>
-          <p:cNvSpPr txBox="1"/>
-          <p:nvPr/>
-        </p:nvSpPr>
-        <p:spPr>
-          <a:xfrm>
-            <a:off x="286812" y="2303406"/>
-            <a:ext cx="2526013" cy="1384995"/>
-          </a:xfrm>
-          <a:prstGeom prst="rect">
-            <a:avLst/>
-          </a:prstGeom>
-          <a:noFill/>
-        </p:spPr>
-        <p:txBody>
-          <a:bodyPr wrap="none" rtlCol="0">
-            <a:spAutoFit/>
-          </a:bodyPr>
-          <a:lstStyle/>
-          <a:p>
-            <a:r>
-              <a:rPr lang="en-GB" sz="1400" dirty="0"/>
-              <a:t>a = b = c = d</a:t>
-            </a:r>
-          </a:p>
-          <a:p>
-            <a:r>
-              <a:rPr lang="en-GB" sz="1400" dirty="0"/>
-              <a:t>r = g = 0</a:t>
-            </a:r>
-          </a:p>
-          <a:p>
-            <a:endParaRPr lang="en-GB" sz="1400" dirty="0"/>
-          </a:p>
-          <a:p>
-            <a:endParaRPr lang="en-GB" sz="1400" dirty="0"/>
-          </a:p>
-          <a:p>
-            <a:r>
-              <a:rPr lang="en-GB" sz="1400" dirty="0"/>
-              <a:t>If a &lt; 0.4 for 5 time points: black</a:t>
-            </a:r>
-            <a:br>
-              <a:rPr lang="en-GB" sz="1400" dirty="0"/>
-            </a:br>
-            <a:r>
-              <a:rPr lang="en-GB" sz="1400" dirty="0"/>
-              <a:t>else: light blue</a:t>
-            </a:r>
-          </a:p>
-        </p:txBody>
-      </p:sp>
-      <p:sp>
-        <p:nvSpPr>
-          <p:cNvPr id="56" name="TextBox 55">
-            <a:extLst>
-              <a:ext uri="{FF2B5EF4-FFF2-40B4-BE49-F238E27FC236}">
-                <a16:creationId xmlns:a16="http://schemas.microsoft.com/office/drawing/2014/main" id="{B41A63CC-90D1-C341-8E62-48C89D019F00}"/>
-              </a:ext>
-            </a:extLst>
-          </p:cNvPr>
-          <p:cNvSpPr txBox="1"/>
-          <p:nvPr/>
-        </p:nvSpPr>
-        <p:spPr>
-          <a:xfrm>
-            <a:off x="3670921" y="2303406"/>
-            <a:ext cx="1649811" cy="1384995"/>
-          </a:xfrm>
-          <a:prstGeom prst="rect">
-            <a:avLst/>
-          </a:prstGeom>
-          <a:noFill/>
-        </p:spPr>
-        <p:txBody>
-          <a:bodyPr wrap="none" rtlCol="0">
-            <a:spAutoFit/>
-          </a:bodyPr>
-          <a:lstStyle/>
-          <a:p>
-            <a:r>
-              <a:rPr lang="en-GB" sz="1400" dirty="0"/>
-              <a:t>a = d</a:t>
-            </a:r>
-          </a:p>
-          <a:p>
-            <a:r>
-              <a:rPr lang="en-GB" sz="1400" dirty="0"/>
-              <a:t>b = c</a:t>
-            </a:r>
-          </a:p>
-          <a:p>
-            <a:r>
-              <a:rPr lang="en-GB" sz="1400" dirty="0"/>
-              <a:t>g = 0</a:t>
-            </a:r>
-          </a:p>
-          <a:p>
-            <a:endParaRPr lang="en-GB" sz="1400" dirty="0"/>
-          </a:p>
-          <a:p>
-            <a:r>
-              <a:rPr lang="en-GB" sz="1400" dirty="0"/>
-              <a:t>If r &lt; 0.75: dark blue</a:t>
-            </a:r>
-            <a:br>
-              <a:rPr lang="en-GB" sz="1400" dirty="0"/>
-            </a:br>
-            <a:r>
-              <a:rPr lang="en-GB" sz="1400" dirty="0"/>
-              <a:t>else: brown</a:t>
-            </a:r>
-          </a:p>
-        </p:txBody>
-      </p:sp>
-      <p:sp>
-        <p:nvSpPr>
-          <p:cNvPr id="57" name="TextBox 56">
-            <a:extLst>
-              <a:ext uri="{FF2B5EF4-FFF2-40B4-BE49-F238E27FC236}">
-                <a16:creationId xmlns:a16="http://schemas.microsoft.com/office/drawing/2014/main" id="{C3362A29-FDC3-EB4F-8C24-308E66C24895}"/>
-              </a:ext>
-            </a:extLst>
-          </p:cNvPr>
-          <p:cNvSpPr txBox="1"/>
-          <p:nvPr/>
-        </p:nvSpPr>
-        <p:spPr>
-          <a:xfrm>
-            <a:off x="6298400" y="2340560"/>
-            <a:ext cx="1985672" cy="1384995"/>
-          </a:xfrm>
-          <a:prstGeom prst="rect">
-            <a:avLst/>
-          </a:prstGeom>
-          <a:noFill/>
-        </p:spPr>
-        <p:txBody>
-          <a:bodyPr wrap="none" rtlCol="0">
-            <a:spAutoFit/>
-          </a:bodyPr>
-          <a:lstStyle/>
-          <a:p>
-            <a:r>
-              <a:rPr lang="en-GB" sz="1400" dirty="0"/>
-              <a:t>a + b &lt; c + d</a:t>
-            </a:r>
-          </a:p>
-          <a:p>
-            <a:endParaRPr lang="en-GB" sz="1400" dirty="0"/>
-          </a:p>
-          <a:p>
-            <a:endParaRPr lang="en-GB" sz="1400" dirty="0"/>
-          </a:p>
-          <a:p>
-            <a:endParaRPr lang="en-GB" sz="1400" dirty="0"/>
-          </a:p>
-          <a:p>
-            <a:r>
-              <a:rPr lang="en-GB" sz="1400" dirty="0"/>
-              <a:t>if a &lt; 0.4 and b &lt; 0.4: red</a:t>
-            </a:r>
-          </a:p>
-          <a:p>
-            <a:r>
-              <a:rPr lang="en-GB" sz="1400" dirty="0"/>
-              <a:t>else: pink</a:t>
-            </a:r>
-          </a:p>
-        </p:txBody>
-      </p:sp>
+      <mc:AlternateContent xmlns:mc="http://schemas.openxmlformats.org/markup-compatibility/2006" xmlns:a14="http://schemas.microsoft.com/office/drawing/2010/main">
+        <mc:Choice Requires="a14">
+          <p:sp>
+            <p:nvSpPr>
+              <p:cNvPr id="46" name="TextBox 45">
+                <a:extLst>
+                  <a:ext uri="{FF2B5EF4-FFF2-40B4-BE49-F238E27FC236}">
+                    <a16:creationId xmlns:a16="http://schemas.microsoft.com/office/drawing/2014/main" id="{D33F25A0-9441-5044-B8B5-2CD31D5A6D5B}"/>
+                  </a:ext>
+                </a:extLst>
+              </p:cNvPr>
+              <p:cNvSpPr txBox="1"/>
+              <p:nvPr/>
+            </p:nvSpPr>
+            <p:spPr>
+              <a:xfrm>
+                <a:off x="286812" y="2303406"/>
+                <a:ext cx="2863797" cy="1384995"/>
+              </a:xfrm>
+              <a:prstGeom prst="rect">
+                <a:avLst/>
+              </a:prstGeom>
+              <a:noFill/>
+            </p:spPr>
+            <p:txBody>
+              <a:bodyPr wrap="none" rtlCol="0">
+                <a:spAutoFit/>
+              </a:bodyPr>
+              <a:lstStyle/>
+              <a:p>
+                <a:pPr/>
+                <a14:m>
+                  <m:oMathPara xmlns:m="http://schemas.openxmlformats.org/officeDocument/2006/math">
+                    <m:oMathParaPr>
+                      <m:jc m:val="left"/>
+                    </m:oMathParaPr>
+                    <m:oMath xmlns:m="http://schemas.openxmlformats.org/officeDocument/2006/math">
+                      <m:r>
+                        <a:rPr lang="en-GB" sz="1400" i="1" dirty="0" smtClean="0">
+                          <a:latin typeface="Cambria Math" panose="02040503050406030204" pitchFamily="18" charset="0"/>
+                        </a:rPr>
+                        <m:t>𝑎</m:t>
+                      </m:r>
+                      <m:r>
+                        <a:rPr lang="en-GB" sz="1400" i="1" dirty="0" smtClean="0">
+                          <a:latin typeface="Cambria Math" panose="02040503050406030204" pitchFamily="18" charset="0"/>
+                        </a:rPr>
+                        <m:t> = </m:t>
+                      </m:r>
+                      <m:r>
+                        <a:rPr lang="en-GB" sz="1400" i="1" dirty="0" smtClean="0">
+                          <a:latin typeface="Cambria Math" panose="02040503050406030204" pitchFamily="18" charset="0"/>
+                        </a:rPr>
+                        <m:t>𝑏</m:t>
+                      </m:r>
+                      <m:r>
+                        <a:rPr lang="en-GB" sz="1400" i="1" dirty="0" smtClean="0">
+                          <a:latin typeface="Cambria Math" panose="02040503050406030204" pitchFamily="18" charset="0"/>
+                        </a:rPr>
+                        <m:t> = </m:t>
+                      </m:r>
+                      <m:r>
+                        <a:rPr lang="en-GB" sz="1400" i="1" dirty="0" smtClean="0">
+                          <a:latin typeface="Cambria Math" panose="02040503050406030204" pitchFamily="18" charset="0"/>
+                        </a:rPr>
+                        <m:t>𝑐</m:t>
+                      </m:r>
+                      <m:r>
+                        <a:rPr lang="en-GB" sz="1400" i="1" dirty="0" smtClean="0">
+                          <a:latin typeface="Cambria Math" panose="02040503050406030204" pitchFamily="18" charset="0"/>
+                        </a:rPr>
+                        <m:t> = </m:t>
+                      </m:r>
+                      <m:r>
+                        <a:rPr lang="en-GB" sz="1400" i="1" dirty="0" smtClean="0">
+                          <a:latin typeface="Cambria Math" panose="02040503050406030204" pitchFamily="18" charset="0"/>
+                        </a:rPr>
+                        <m:t>𝑑</m:t>
+                      </m:r>
+                    </m:oMath>
+                  </m:oMathPara>
+                </a14:m>
+                <a:endParaRPr lang="en-GB" sz="1400" dirty="0"/>
+              </a:p>
+              <a:p>
+                <a:pPr/>
+                <a14:m>
+                  <m:oMathPara xmlns:m="http://schemas.openxmlformats.org/officeDocument/2006/math">
+                    <m:oMathParaPr>
+                      <m:jc m:val="left"/>
+                    </m:oMathParaPr>
+                    <m:oMath xmlns:m="http://schemas.openxmlformats.org/officeDocument/2006/math">
+                      <m:r>
+                        <a:rPr lang="en-GB" sz="1400" i="1" dirty="0" smtClean="0">
+                          <a:latin typeface="Cambria Math" panose="02040503050406030204" pitchFamily="18" charset="0"/>
+                        </a:rPr>
+                        <m:t>𝑟</m:t>
+                      </m:r>
+                      <m:r>
+                        <a:rPr lang="en-GB" sz="1400" i="1" dirty="0" smtClean="0">
+                          <a:latin typeface="Cambria Math" panose="02040503050406030204" pitchFamily="18" charset="0"/>
+                        </a:rPr>
+                        <m:t> = </m:t>
+                      </m:r>
+                      <m:r>
+                        <a:rPr lang="en-GB" sz="1400" i="1" dirty="0" smtClean="0">
+                          <a:latin typeface="Cambria Math" panose="02040503050406030204" pitchFamily="18" charset="0"/>
+                        </a:rPr>
+                        <m:t>𝑔</m:t>
+                      </m:r>
+                      <m:r>
+                        <a:rPr lang="en-GB" sz="1400" i="1" dirty="0" smtClean="0">
+                          <a:latin typeface="Cambria Math" panose="02040503050406030204" pitchFamily="18" charset="0"/>
+                        </a:rPr>
+                        <m:t> = 0</m:t>
+                      </m:r>
+                    </m:oMath>
+                  </m:oMathPara>
+                </a14:m>
+                <a:endParaRPr lang="en-GB" sz="1400" dirty="0"/>
+              </a:p>
+              <a:p>
+                <a:endParaRPr lang="en-GB" sz="1400" dirty="0"/>
+              </a:p>
+              <a:p>
+                <a:endParaRPr lang="en-GB" sz="1400" dirty="0"/>
+              </a:p>
+              <a:p>
+                <a:r>
+                  <a:rPr lang="en-GB" sz="1400" dirty="0"/>
+                  <a:t>If </a:t>
+                </a:r>
+                <a14:m>
+                  <m:oMath xmlns:m="http://schemas.openxmlformats.org/officeDocument/2006/math">
+                    <m:r>
+                      <a:rPr lang="en-GB" sz="1400" b="0" i="1" smtClean="0">
+                        <a:latin typeface="Cambria Math" panose="02040503050406030204" pitchFamily="18" charset="0"/>
+                      </a:rPr>
+                      <m:t>𝑎</m:t>
+                    </m:r>
+                    <m:r>
+                      <a:rPr lang="en-GB" sz="1400" b="0" i="1" smtClean="0">
+                        <a:latin typeface="Cambria Math" panose="02040503050406030204" pitchFamily="18" charset="0"/>
+                      </a:rPr>
+                      <m:t>&lt;</m:t>
+                    </m:r>
+                    <m:sSub>
+                      <m:sSubPr>
+                        <m:ctrlPr>
+                          <a:rPr lang="en-GB" sz="1400" b="0" i="1" smtClean="0">
+                            <a:latin typeface="Cambria Math" panose="02040503050406030204" pitchFamily="18" charset="0"/>
+                          </a:rPr>
+                        </m:ctrlPr>
+                      </m:sSubPr>
+                      <m:e>
+                        <m:r>
+                          <m:rPr>
+                            <m:sty m:val="p"/>
+                          </m:rPr>
+                          <a:rPr lang="en-GB" sz="1400" b="0" i="0" smtClean="0">
+                            <a:latin typeface="Cambria Math" panose="02040503050406030204" pitchFamily="18" charset="0"/>
+                          </a:rPr>
+                          <m:t>Δ</m:t>
+                        </m:r>
+                      </m:e>
+                      <m:sub>
+                        <m:r>
+                          <a:rPr lang="en-GB" sz="1400" b="0" i="1" smtClean="0">
+                            <a:latin typeface="Cambria Math" panose="02040503050406030204" pitchFamily="18" charset="0"/>
+                          </a:rPr>
+                          <m:t>𝐵𝐿</m:t>
+                        </m:r>
+                      </m:sub>
+                    </m:sSub>
+                  </m:oMath>
+                </a14:m>
+                <a:r>
+                  <a:rPr lang="en-GB" sz="1400" dirty="0"/>
+                  <a:t> for </a:t>
+                </a:r>
+                <a14:m>
+                  <m:oMath xmlns:m="http://schemas.openxmlformats.org/officeDocument/2006/math">
+                    <m:sSub>
+                      <m:sSubPr>
+                        <m:ctrlPr>
+                          <a:rPr lang="en-GB" sz="1400" b="0" i="1" smtClean="0">
+                            <a:latin typeface="Cambria Math" panose="02040503050406030204" pitchFamily="18" charset="0"/>
+                          </a:rPr>
+                        </m:ctrlPr>
+                      </m:sSubPr>
+                      <m:e>
+                        <m:r>
+                          <a:rPr lang="en-GB" sz="1400" b="0" i="1" smtClean="0">
+                            <a:latin typeface="Cambria Math" panose="02040503050406030204" pitchFamily="18" charset="0"/>
+                          </a:rPr>
+                          <m:t>𝑛</m:t>
+                        </m:r>
+                      </m:e>
+                      <m:sub>
+                        <m:r>
+                          <a:rPr lang="en-GB" sz="1400" b="0" i="1" smtClean="0">
+                            <a:latin typeface="Cambria Math" panose="02040503050406030204" pitchFamily="18" charset="0"/>
+                          </a:rPr>
+                          <m:t>𝐾</m:t>
+                        </m:r>
+                      </m:sub>
+                    </m:sSub>
+                  </m:oMath>
+                </a14:m>
+                <a:r>
+                  <a:rPr lang="en-GB" sz="1400" dirty="0"/>
+                  <a:t> time points: black</a:t>
+                </a:r>
+                <a:br>
+                  <a:rPr lang="en-GB" sz="1400" dirty="0"/>
+                </a:br>
+                <a:r>
+                  <a:rPr lang="en-GB" sz="1400" dirty="0"/>
+                  <a:t>else: light blue</a:t>
+                </a:r>
+              </a:p>
+            </p:txBody>
+          </p:sp>
+        </mc:Choice>
+        <mc:Fallback xmlns="">
+          <p:sp>
+            <p:nvSpPr>
+              <p:cNvPr id="46" name="TextBox 45">
+                <a:extLst>
+                  <a:ext uri="{FF2B5EF4-FFF2-40B4-BE49-F238E27FC236}">
+                    <a16:creationId xmlns:a16="http://schemas.microsoft.com/office/drawing/2014/main" id="{D33F25A0-9441-5044-B8B5-2CD31D5A6D5B}"/>
+                  </a:ext>
+                </a:extLst>
+              </p:cNvPr>
+              <p:cNvSpPr txBox="1">
+                <a:spLocks noRot="1" noChangeAspect="1" noMove="1" noResize="1" noEditPoints="1" noAdjustHandles="1" noChangeArrowheads="1" noChangeShapeType="1" noTextEdit="1"/>
+              </p:cNvSpPr>
+              <p:nvPr/>
+            </p:nvSpPr>
+            <p:spPr>
+              <a:xfrm>
+                <a:off x="286812" y="2303406"/>
+                <a:ext cx="2863797" cy="1384995"/>
+              </a:xfrm>
+              <a:prstGeom prst="rect">
+                <a:avLst/>
+              </a:prstGeom>
+              <a:blipFill>
+                <a:blip r:embed="rId2"/>
+                <a:stretch>
+                  <a:fillRect l="-441" b="-3636"/>
+                </a:stretch>
+              </a:blipFill>
+            </p:spPr>
+            <p:txBody>
+              <a:bodyPr/>
+              <a:lstStyle/>
+              <a:p>
+                <a:r>
+                  <a:rPr lang="en-GB">
+                    <a:noFill/>
+                  </a:rPr>
+                  <a:t> </a:t>
+                </a:r>
+              </a:p>
+            </p:txBody>
+          </p:sp>
+        </mc:Fallback>
+      </mc:AlternateContent>
+      <mc:AlternateContent xmlns:mc="http://schemas.openxmlformats.org/markup-compatibility/2006" xmlns:a14="http://schemas.microsoft.com/office/drawing/2010/main">
+        <mc:Choice Requires="a14">
+          <p:sp>
+            <p:nvSpPr>
+              <p:cNvPr id="56" name="TextBox 55">
+                <a:extLst>
+                  <a:ext uri="{FF2B5EF4-FFF2-40B4-BE49-F238E27FC236}">
+                    <a16:creationId xmlns:a16="http://schemas.microsoft.com/office/drawing/2014/main" id="{B41A63CC-90D1-C341-8E62-48C89D019F00}"/>
+                  </a:ext>
+                </a:extLst>
+              </p:cNvPr>
+              <p:cNvSpPr txBox="1"/>
+              <p:nvPr/>
+            </p:nvSpPr>
+            <p:spPr>
+              <a:xfrm>
+                <a:off x="3670921" y="2303406"/>
+                <a:ext cx="1727204" cy="1384995"/>
+              </a:xfrm>
+              <a:prstGeom prst="rect">
+                <a:avLst/>
+              </a:prstGeom>
+              <a:noFill/>
+            </p:spPr>
+            <p:txBody>
+              <a:bodyPr wrap="none" rtlCol="0">
+                <a:spAutoFit/>
+              </a:bodyPr>
+              <a:lstStyle/>
+              <a:p>
+                <a:pPr/>
+                <a14:m>
+                  <m:oMathPara xmlns:m="http://schemas.openxmlformats.org/officeDocument/2006/math">
+                    <m:oMathParaPr>
+                      <m:jc m:val="left"/>
+                    </m:oMathParaPr>
+                    <m:oMath xmlns:m="http://schemas.openxmlformats.org/officeDocument/2006/math">
+                      <m:r>
+                        <a:rPr lang="en-GB" sz="1400" i="1" dirty="0" smtClean="0">
+                          <a:latin typeface="Cambria Math" panose="02040503050406030204" pitchFamily="18" charset="0"/>
+                        </a:rPr>
+                        <m:t>𝑎</m:t>
+                      </m:r>
+                      <m:r>
+                        <a:rPr lang="en-GB" sz="1400" i="1" dirty="0" smtClean="0">
+                          <a:latin typeface="Cambria Math" panose="02040503050406030204" pitchFamily="18" charset="0"/>
+                        </a:rPr>
+                        <m:t> = </m:t>
+                      </m:r>
+                      <m:r>
+                        <a:rPr lang="en-GB" sz="1400" i="1" dirty="0" smtClean="0">
+                          <a:latin typeface="Cambria Math" panose="02040503050406030204" pitchFamily="18" charset="0"/>
+                        </a:rPr>
+                        <m:t>𝑑</m:t>
+                      </m:r>
+                    </m:oMath>
+                  </m:oMathPara>
+                </a14:m>
+                <a:endParaRPr lang="en-GB" sz="1400" dirty="0"/>
+              </a:p>
+              <a:p>
+                <a:pPr/>
+                <a14:m>
+                  <m:oMathPara xmlns:m="http://schemas.openxmlformats.org/officeDocument/2006/math">
+                    <m:oMathParaPr>
+                      <m:jc m:val="left"/>
+                    </m:oMathParaPr>
+                    <m:oMath xmlns:m="http://schemas.openxmlformats.org/officeDocument/2006/math">
+                      <m:r>
+                        <a:rPr lang="en-GB" sz="1400" i="1" dirty="0" smtClean="0">
+                          <a:latin typeface="Cambria Math" panose="02040503050406030204" pitchFamily="18" charset="0"/>
+                        </a:rPr>
+                        <m:t>𝑏</m:t>
+                      </m:r>
+                      <m:r>
+                        <a:rPr lang="en-GB" sz="1400" i="1" dirty="0" smtClean="0">
+                          <a:latin typeface="Cambria Math" panose="02040503050406030204" pitchFamily="18" charset="0"/>
+                        </a:rPr>
+                        <m:t> = </m:t>
+                      </m:r>
+                      <m:r>
+                        <a:rPr lang="en-GB" sz="1400" i="1" dirty="0" smtClean="0">
+                          <a:latin typeface="Cambria Math" panose="02040503050406030204" pitchFamily="18" charset="0"/>
+                        </a:rPr>
+                        <m:t>𝑐</m:t>
+                      </m:r>
+                    </m:oMath>
+                  </m:oMathPara>
+                </a14:m>
+                <a:endParaRPr lang="en-GB" sz="1400" dirty="0"/>
+              </a:p>
+              <a:p>
+                <a:pPr/>
+                <a14:m>
+                  <m:oMathPara xmlns:m="http://schemas.openxmlformats.org/officeDocument/2006/math">
+                    <m:oMathParaPr>
+                      <m:jc m:val="left"/>
+                    </m:oMathParaPr>
+                    <m:oMath xmlns:m="http://schemas.openxmlformats.org/officeDocument/2006/math">
+                      <m:r>
+                        <a:rPr lang="en-GB" sz="1400" i="1" dirty="0" smtClean="0">
+                          <a:latin typeface="Cambria Math" panose="02040503050406030204" pitchFamily="18" charset="0"/>
+                        </a:rPr>
+                        <m:t>𝑔</m:t>
+                      </m:r>
+                      <m:r>
+                        <a:rPr lang="en-GB" sz="1400" i="1" dirty="0" smtClean="0">
+                          <a:latin typeface="Cambria Math" panose="02040503050406030204" pitchFamily="18" charset="0"/>
+                        </a:rPr>
+                        <m:t> = 0</m:t>
+                      </m:r>
+                    </m:oMath>
+                  </m:oMathPara>
+                </a14:m>
+                <a:endParaRPr lang="en-GB" sz="1400" dirty="0"/>
+              </a:p>
+              <a:p>
+                <a:endParaRPr lang="en-GB" sz="1400" dirty="0"/>
+              </a:p>
+              <a:p>
+                <a:r>
+                  <a:rPr lang="en-GB" sz="1400" dirty="0"/>
+                  <a:t>If </a:t>
+                </a:r>
+                <a14:m>
+                  <m:oMath xmlns:m="http://schemas.openxmlformats.org/officeDocument/2006/math">
+                    <m:r>
+                      <a:rPr lang="en-GB" sz="1400" i="1" dirty="0" smtClean="0">
+                        <a:latin typeface="Cambria Math" panose="02040503050406030204" pitchFamily="18" charset="0"/>
+                      </a:rPr>
+                      <m:t>𝑟</m:t>
+                    </m:r>
+                    <m:r>
+                      <a:rPr lang="en-GB" sz="1400" i="1" dirty="0" smtClean="0">
+                        <a:latin typeface="Cambria Math" panose="02040503050406030204" pitchFamily="18" charset="0"/>
+                      </a:rPr>
+                      <m:t>&lt;</m:t>
+                    </m:r>
+                    <m:sSub>
+                      <m:sSubPr>
+                        <m:ctrlPr>
+                          <a:rPr lang="en-GB" sz="1400" b="0" i="1" dirty="0" smtClean="0">
+                            <a:latin typeface="Cambria Math" panose="02040503050406030204" pitchFamily="18" charset="0"/>
+                          </a:rPr>
+                        </m:ctrlPr>
+                      </m:sSubPr>
+                      <m:e>
+                        <m:r>
+                          <m:rPr>
+                            <m:sty m:val="p"/>
+                          </m:rPr>
+                          <a:rPr lang="en-GB" sz="1400" b="0" i="0" dirty="0" smtClean="0">
+                            <a:latin typeface="Cambria Math" panose="02040503050406030204" pitchFamily="18" charset="0"/>
+                          </a:rPr>
+                          <m:t>Δ</m:t>
+                        </m:r>
+                      </m:e>
+                      <m:sub>
+                        <m:r>
+                          <a:rPr lang="en-GB" sz="1400" b="0" i="1" dirty="0" smtClean="0">
+                            <a:latin typeface="Cambria Math" panose="02040503050406030204" pitchFamily="18" charset="0"/>
+                          </a:rPr>
+                          <m:t>𝐵𝑁</m:t>
+                        </m:r>
+                      </m:sub>
+                    </m:sSub>
+                  </m:oMath>
+                </a14:m>
+                <a:r>
+                  <a:rPr lang="en-GB" sz="1400" dirty="0"/>
+                  <a:t>: dark blue</a:t>
+                </a:r>
+                <a:br>
+                  <a:rPr lang="en-GB" sz="1400" dirty="0"/>
+                </a:br>
+                <a:r>
+                  <a:rPr lang="en-GB" sz="1400" dirty="0"/>
+                  <a:t>else: brown</a:t>
+                </a:r>
+              </a:p>
+            </p:txBody>
+          </p:sp>
+        </mc:Choice>
+        <mc:Fallback xmlns="">
+          <p:sp>
+            <p:nvSpPr>
+              <p:cNvPr id="56" name="TextBox 55">
+                <a:extLst>
+                  <a:ext uri="{FF2B5EF4-FFF2-40B4-BE49-F238E27FC236}">
+                    <a16:creationId xmlns:a16="http://schemas.microsoft.com/office/drawing/2014/main" id="{B41A63CC-90D1-C341-8E62-48C89D019F00}"/>
+                  </a:ext>
+                </a:extLst>
+              </p:cNvPr>
+              <p:cNvSpPr txBox="1">
+                <a:spLocks noRot="1" noChangeAspect="1" noMove="1" noResize="1" noEditPoints="1" noAdjustHandles="1" noChangeArrowheads="1" noChangeShapeType="1" noTextEdit="1"/>
+              </p:cNvSpPr>
+              <p:nvPr/>
+            </p:nvSpPr>
+            <p:spPr>
+              <a:xfrm>
+                <a:off x="3670921" y="2303406"/>
+                <a:ext cx="1727204" cy="1384995"/>
+              </a:xfrm>
+              <a:prstGeom prst="rect">
+                <a:avLst/>
+              </a:prstGeom>
+              <a:blipFill>
+                <a:blip r:embed="rId3"/>
+                <a:stretch>
+                  <a:fillRect l="-725" b="-3636"/>
+                </a:stretch>
+              </a:blipFill>
+            </p:spPr>
+            <p:txBody>
+              <a:bodyPr/>
+              <a:lstStyle/>
+              <a:p>
+                <a:r>
+                  <a:rPr lang="en-GB">
+                    <a:noFill/>
+                  </a:rPr>
+                  <a:t> </a:t>
+                </a:r>
+              </a:p>
+            </p:txBody>
+          </p:sp>
+        </mc:Fallback>
+      </mc:AlternateContent>
+      <mc:AlternateContent xmlns:mc="http://schemas.openxmlformats.org/markup-compatibility/2006">
+        <mc:Choice xmlns:a14="http://schemas.microsoft.com/office/drawing/2010/main" Requires="a14">
+          <p:sp>
+            <p:nvSpPr>
+              <p:cNvPr id="57" name="TextBox 56">
+                <a:extLst>
+                  <a:ext uri="{FF2B5EF4-FFF2-40B4-BE49-F238E27FC236}">
+                    <a16:creationId xmlns:a16="http://schemas.microsoft.com/office/drawing/2014/main" id="{C3362A29-FDC3-EB4F-8C24-308E66C24895}"/>
+                  </a:ext>
+                </a:extLst>
+              </p:cNvPr>
+              <p:cNvSpPr txBox="1"/>
+              <p:nvPr/>
+            </p:nvSpPr>
+            <p:spPr>
+              <a:xfrm>
+                <a:off x="6298400" y="2340560"/>
+                <a:ext cx="3587392" cy="1833387"/>
+              </a:xfrm>
+              <a:prstGeom prst="rect">
+                <a:avLst/>
+              </a:prstGeom>
+              <a:noFill/>
+            </p:spPr>
+            <p:txBody>
+              <a:bodyPr wrap="none" rtlCol="0">
+                <a:spAutoFit/>
+              </a:bodyPr>
+              <a:lstStyle/>
+              <a:p>
+                <a:pPr/>
+                <a14:m>
+                  <m:oMathPara xmlns:m="http://schemas.openxmlformats.org/officeDocument/2006/math">
+                    <m:oMathParaPr>
+                      <m:jc m:val="left"/>
+                    </m:oMathParaPr>
+                    <m:oMath xmlns:m="http://schemas.openxmlformats.org/officeDocument/2006/math">
+                      <m:r>
+                        <a:rPr lang="en-GB" sz="1400" i="1" dirty="0" smtClean="0">
+                          <a:latin typeface="Cambria Math" panose="02040503050406030204" pitchFamily="18" charset="0"/>
+                        </a:rPr>
+                        <m:t>𝑎</m:t>
+                      </m:r>
+                      <m:r>
+                        <a:rPr lang="en-GB" sz="1400" i="1" dirty="0" smtClean="0">
+                          <a:latin typeface="Cambria Math" panose="02040503050406030204" pitchFamily="18" charset="0"/>
+                        </a:rPr>
+                        <m:t> + </m:t>
+                      </m:r>
+                      <m:r>
+                        <a:rPr lang="en-GB" sz="1400" i="1" dirty="0" smtClean="0">
+                          <a:latin typeface="Cambria Math" panose="02040503050406030204" pitchFamily="18" charset="0"/>
+                        </a:rPr>
+                        <m:t>𝑏</m:t>
+                      </m:r>
+                      <m:r>
+                        <a:rPr lang="en-GB" sz="1400" i="1" dirty="0" smtClean="0">
+                          <a:latin typeface="Cambria Math" panose="02040503050406030204" pitchFamily="18" charset="0"/>
+                        </a:rPr>
+                        <m:t> &lt; </m:t>
+                      </m:r>
+                      <m:r>
+                        <a:rPr lang="en-GB" sz="1400" i="1" dirty="0" smtClean="0">
+                          <a:latin typeface="Cambria Math" panose="02040503050406030204" pitchFamily="18" charset="0"/>
+                        </a:rPr>
+                        <m:t>𝑐</m:t>
+                      </m:r>
+                      <m:r>
+                        <a:rPr lang="en-GB" sz="1400" i="1" dirty="0" smtClean="0">
+                          <a:latin typeface="Cambria Math" panose="02040503050406030204" pitchFamily="18" charset="0"/>
+                        </a:rPr>
+                        <m:t> + </m:t>
+                      </m:r>
+                      <m:r>
+                        <a:rPr lang="en-GB" sz="1400" i="1" dirty="0" smtClean="0">
+                          <a:latin typeface="Cambria Math" panose="02040503050406030204" pitchFamily="18" charset="0"/>
+                        </a:rPr>
+                        <m:t>𝑑</m:t>
+                      </m:r>
+                    </m:oMath>
+                  </m:oMathPara>
+                </a14:m>
+                <a:endParaRPr lang="en-GB" sz="1400" dirty="0"/>
+              </a:p>
+              <a:p>
+                <a:endParaRPr lang="en-GB" sz="1400" dirty="0"/>
+              </a:p>
+              <a:p>
+                <a:r>
+                  <a:rPr lang="en-GB" sz="1400" dirty="0"/>
+                  <a:t>if </a:t>
+                </a:r>
+                <a14:m>
+                  <m:oMath xmlns:m="http://schemas.openxmlformats.org/officeDocument/2006/math">
+                    <m:r>
+                      <a:rPr lang="en-GB" sz="1400" i="1" smtClean="0">
+                        <a:latin typeface="Cambria Math" panose="02040503050406030204" pitchFamily="18" charset="0"/>
+                        <a:ea typeface="Cambria Math" panose="02040503050406030204" pitchFamily="18" charset="0"/>
+                      </a:rPr>
+                      <m:t>∡</m:t>
+                    </m:r>
+                    <m:r>
+                      <a:rPr lang="en-GB" sz="1400" b="0" i="1" smtClean="0">
+                        <a:latin typeface="Cambria Math" panose="02040503050406030204" pitchFamily="18" charset="0"/>
+                        <a:ea typeface="Cambria Math" panose="02040503050406030204" pitchFamily="18" charset="0"/>
+                      </a:rPr>
+                      <m:t>{</m:t>
+                    </m:r>
+                    <m:r>
+                      <a:rPr lang="en-GB" sz="1400" b="0" i="1" smtClean="0">
+                        <a:latin typeface="Cambria Math" panose="02040503050406030204" pitchFamily="18" charset="0"/>
+                        <a:ea typeface="Cambria Math" panose="02040503050406030204" pitchFamily="18" charset="0"/>
+                      </a:rPr>
+                      <m:t>𝑟𝑔</m:t>
+                    </m:r>
+                    <m:r>
+                      <a:rPr lang="en-GB" sz="1400" b="0" i="1" smtClean="0">
+                        <a:latin typeface="Cambria Math" panose="02040503050406030204" pitchFamily="18" charset="0"/>
+                        <a:ea typeface="Cambria Math" panose="02040503050406030204" pitchFamily="18" charset="0"/>
+                      </a:rPr>
+                      <m:t>}&lt;</m:t>
+                    </m:r>
+                    <m:sSub>
+                      <m:sSubPr>
+                        <m:ctrlPr>
+                          <a:rPr lang="en-GB" sz="1400" b="0" i="1" smtClean="0">
+                            <a:latin typeface="Cambria Math" panose="02040503050406030204" pitchFamily="18" charset="0"/>
+                            <a:ea typeface="Cambria Math" panose="02040503050406030204" pitchFamily="18" charset="0"/>
+                          </a:rPr>
+                        </m:ctrlPr>
+                      </m:sSubPr>
+                      <m:e>
+                        <m:r>
+                          <m:rPr>
+                            <m:sty m:val="p"/>
+                          </m:rPr>
+                          <a:rPr lang="el-GR" sz="1400" b="0" i="1" smtClean="0">
+                            <a:latin typeface="Cambria Math" panose="02040503050406030204" pitchFamily="18" charset="0"/>
+                            <a:ea typeface="Cambria Math" panose="02040503050406030204" pitchFamily="18" charset="0"/>
+                          </a:rPr>
+                          <m:t>Α</m:t>
+                        </m:r>
+                      </m:e>
+                      <m:sub>
+                        <m:r>
+                          <a:rPr lang="en-GB" sz="1400" b="0" i="1" smtClean="0">
+                            <a:latin typeface="Cambria Math" panose="02040503050406030204" pitchFamily="18" charset="0"/>
+                            <a:ea typeface="Cambria Math" panose="02040503050406030204" pitchFamily="18" charset="0"/>
+                          </a:rPr>
+                          <m:t>𝑟𝑔</m:t>
+                        </m:r>
+                      </m:sub>
+                    </m:sSub>
+                  </m:oMath>
+                </a14:m>
+                <a:r>
+                  <a:rPr lang="en-GB" sz="1400" dirty="0"/>
+                  <a:t> and </a:t>
+                </a:r>
+                <a14:m>
+                  <m:oMath xmlns:m="http://schemas.openxmlformats.org/officeDocument/2006/math">
+                    <m:r>
+                      <a:rPr lang="en-GB" sz="1400" i="1" dirty="0" smtClean="0">
+                        <a:latin typeface="Cambria Math" panose="02040503050406030204" pitchFamily="18" charset="0"/>
+                      </a:rPr>
+                      <m:t>𝑎</m:t>
+                    </m:r>
+                    <m:r>
+                      <a:rPr lang="en-GB" sz="1400" i="1" dirty="0" smtClean="0">
+                        <a:latin typeface="Cambria Math" panose="02040503050406030204" pitchFamily="18" charset="0"/>
+                      </a:rPr>
+                      <m:t>&lt;</m:t>
+                    </m:r>
+                    <m:sSub>
+                      <m:sSubPr>
+                        <m:ctrlPr>
+                          <a:rPr lang="en-GB" sz="1400" b="0" i="1" dirty="0" smtClean="0">
+                            <a:latin typeface="Cambria Math" panose="02040503050406030204" pitchFamily="18" charset="0"/>
+                          </a:rPr>
+                        </m:ctrlPr>
+                      </m:sSubPr>
+                      <m:e>
+                        <m:r>
+                          <m:rPr>
+                            <m:sty m:val="p"/>
+                          </m:rPr>
+                          <a:rPr lang="en-GB" sz="1400" b="0" i="0" dirty="0" smtClean="0">
+                            <a:latin typeface="Cambria Math" panose="02040503050406030204" pitchFamily="18" charset="0"/>
+                          </a:rPr>
+                          <m:t>Δ</m:t>
+                        </m:r>
+                      </m:e>
+                      <m:sub>
+                        <m:r>
+                          <a:rPr lang="en-GB" sz="1400" b="0" i="1" dirty="0" smtClean="0">
+                            <a:latin typeface="Cambria Math" panose="02040503050406030204" pitchFamily="18" charset="0"/>
+                          </a:rPr>
+                          <m:t>𝑅𝑃</m:t>
+                        </m:r>
+                      </m:sub>
+                    </m:sSub>
+                    <m:r>
+                      <a:rPr lang="en-GB" sz="1400" i="1" dirty="0" smtClean="0">
+                        <a:latin typeface="Cambria Math" panose="02040503050406030204" pitchFamily="18" charset="0"/>
+                      </a:rPr>
+                      <m:t> </m:t>
+                    </m:r>
+                  </m:oMath>
+                </a14:m>
+                <a:r>
+                  <a:rPr lang="en-GB" sz="1400" dirty="0"/>
+                  <a:t>and </a:t>
+                </a:r>
+                <a14:m>
+                  <m:oMath xmlns:m="http://schemas.openxmlformats.org/officeDocument/2006/math">
+                    <m:r>
+                      <a:rPr lang="en-GB" sz="1400" i="1" dirty="0" smtClean="0">
+                        <a:latin typeface="Cambria Math" panose="02040503050406030204" pitchFamily="18" charset="0"/>
+                      </a:rPr>
+                      <m:t>𝑏</m:t>
+                    </m:r>
+                    <m:r>
+                      <a:rPr lang="en-GB" sz="1400" i="1" dirty="0" smtClean="0">
+                        <a:latin typeface="Cambria Math" panose="02040503050406030204" pitchFamily="18" charset="0"/>
+                      </a:rPr>
+                      <m:t>&lt;</m:t>
+                    </m:r>
+                    <m:sSub>
+                      <m:sSubPr>
+                        <m:ctrlPr>
+                          <a:rPr lang="en-GB" sz="1400" b="0" i="1" dirty="0" smtClean="0">
+                            <a:latin typeface="Cambria Math" panose="02040503050406030204" pitchFamily="18" charset="0"/>
+                          </a:rPr>
+                        </m:ctrlPr>
+                      </m:sSubPr>
+                      <m:e>
+                        <m:r>
+                          <m:rPr>
+                            <m:sty m:val="p"/>
+                          </m:rPr>
+                          <a:rPr lang="en-GB" sz="1400" b="0" i="0" dirty="0" smtClean="0">
+                            <a:latin typeface="Cambria Math" panose="02040503050406030204" pitchFamily="18" charset="0"/>
+                          </a:rPr>
+                          <m:t>Δ</m:t>
+                        </m:r>
+                      </m:e>
+                      <m:sub>
+                        <m:r>
+                          <a:rPr lang="en-GB" sz="1400" b="0" i="1" dirty="0" smtClean="0">
+                            <a:latin typeface="Cambria Math" panose="02040503050406030204" pitchFamily="18" charset="0"/>
+                          </a:rPr>
+                          <m:t>𝑅𝑃</m:t>
+                        </m:r>
+                      </m:sub>
+                    </m:sSub>
+                  </m:oMath>
+                </a14:m>
+                <a:r>
+                  <a:rPr lang="en-GB" sz="1400" dirty="0"/>
+                  <a:t>: red</a:t>
+                </a:r>
+              </a:p>
+              <a:p>
+                <a:r>
+                  <a:rPr lang="en-GB" sz="1400" dirty="0"/>
+                  <a:t>else: pink</a:t>
+                </a:r>
+              </a:p>
+              <a:p>
+                <a:endParaRPr lang="en-GB" sz="1400" dirty="0"/>
+              </a:p>
+              <a:p>
+                <a:r>
+                  <a:rPr lang="en-GB" sz="1400" dirty="0"/>
+                  <a:t>but</a:t>
+                </a:r>
+              </a:p>
+              <a:p>
+                <a:endParaRPr lang="en-GB" sz="1400" dirty="0"/>
+              </a:p>
+              <a:p>
+                <a:r>
+                  <a:rPr lang="en-GB" sz="1400" dirty="0"/>
+                  <a:t>if </a:t>
+                </a:r>
+                <a14:m>
+                  <m:oMath xmlns:m="http://schemas.openxmlformats.org/officeDocument/2006/math">
+                    <m:r>
+                      <a:rPr lang="en-GB" sz="1400" i="1" dirty="0" smtClean="0">
+                        <a:latin typeface="Cambria Math" panose="02040503050406030204" pitchFamily="18" charset="0"/>
+                      </a:rPr>
+                      <m:t>𝑟</m:t>
+                    </m:r>
+                    <m:r>
+                      <a:rPr lang="en-GB" sz="1400" i="1" dirty="0" smtClean="0">
+                        <a:latin typeface="Cambria Math" panose="02040503050406030204" pitchFamily="18" charset="0"/>
+                      </a:rPr>
+                      <m:t>&lt;</m:t>
+                    </m:r>
+                    <m:sSub>
+                      <m:sSubPr>
+                        <m:ctrlPr>
+                          <a:rPr lang="en-GB" sz="1400" b="0" i="1" dirty="0" smtClean="0">
+                            <a:latin typeface="Cambria Math" panose="02040503050406030204" pitchFamily="18" charset="0"/>
+                          </a:rPr>
+                        </m:ctrlPr>
+                      </m:sSubPr>
+                      <m:e>
+                        <m:r>
+                          <m:rPr>
+                            <m:sty m:val="p"/>
+                          </m:rPr>
+                          <a:rPr lang="en-GB" sz="1400" b="0" i="0" dirty="0" smtClean="0">
+                            <a:latin typeface="Cambria Math" panose="02040503050406030204" pitchFamily="18" charset="0"/>
+                          </a:rPr>
+                          <m:t>Δ</m:t>
+                        </m:r>
+                      </m:e>
+                      <m:sub>
+                        <m:r>
+                          <a:rPr lang="en-GB" sz="1400" b="0" i="1" dirty="0" smtClean="0">
+                            <a:latin typeface="Cambria Math" panose="02040503050406030204" pitchFamily="18" charset="0"/>
+                          </a:rPr>
+                          <m:t>𝑊𝑅𝑃</m:t>
+                        </m:r>
+                      </m:sub>
+                    </m:sSub>
+                    <m:r>
+                      <a:rPr lang="en-GB" sz="1400" i="1" dirty="0" smtClean="0">
+                        <a:latin typeface="Cambria Math" panose="02040503050406030204" pitchFamily="18" charset="0"/>
+                      </a:rPr>
+                      <m:t> </m:t>
+                    </m:r>
+                  </m:oMath>
+                </a14:m>
+                <a:r>
+                  <a:rPr lang="en-GB" sz="1400" dirty="0"/>
+                  <a:t>or </a:t>
+                </a:r>
+                <a14:m>
+                  <m:oMath xmlns:m="http://schemas.openxmlformats.org/officeDocument/2006/math">
+                    <m:r>
+                      <a:rPr lang="en-GB" sz="1400" i="1" dirty="0" smtClean="0">
+                        <a:latin typeface="Cambria Math" panose="02040503050406030204" pitchFamily="18" charset="0"/>
+                      </a:rPr>
+                      <m:t>𝑔</m:t>
+                    </m:r>
+                    <m:r>
+                      <a:rPr lang="en-GB" sz="1400" i="1" dirty="0" smtClean="0">
+                        <a:latin typeface="Cambria Math" panose="02040503050406030204" pitchFamily="18" charset="0"/>
+                      </a:rPr>
+                      <m:t>&lt;</m:t>
+                    </m:r>
+                    <m:sSub>
+                      <m:sSubPr>
+                        <m:ctrlPr>
+                          <a:rPr lang="en-GB" sz="1400" b="0" i="1" dirty="0" smtClean="0">
+                            <a:latin typeface="Cambria Math" panose="02040503050406030204" pitchFamily="18" charset="0"/>
+                          </a:rPr>
+                        </m:ctrlPr>
+                      </m:sSubPr>
+                      <m:e>
+                        <m:r>
+                          <m:rPr>
+                            <m:sty m:val="p"/>
+                          </m:rPr>
+                          <a:rPr lang="en-GB" sz="1400" b="0" i="0" dirty="0" smtClean="0">
+                            <a:latin typeface="Cambria Math" panose="02040503050406030204" pitchFamily="18" charset="0"/>
+                          </a:rPr>
+                          <m:t>Δ</m:t>
+                        </m:r>
+                      </m:e>
+                      <m:sub>
+                        <m:r>
+                          <a:rPr lang="en-GB" sz="1400" b="0" i="1" dirty="0" smtClean="0">
+                            <a:latin typeface="Cambria Math" panose="02040503050406030204" pitchFamily="18" charset="0"/>
+                          </a:rPr>
+                          <m:t>𝑊𝑅𝑃</m:t>
+                        </m:r>
+                      </m:sub>
+                    </m:sSub>
+                  </m:oMath>
+                </a14:m>
+                <a:r>
+                  <a:rPr lang="en-GB" sz="1400" dirty="0"/>
+                  <a:t>: brown</a:t>
+                </a:r>
+              </a:p>
+            </p:txBody>
+          </p:sp>
+        </mc:Choice>
+        <mc:Fallback>
+          <p:sp>
+            <p:nvSpPr>
+              <p:cNvPr id="57" name="TextBox 56">
+                <a:extLst>
+                  <a:ext uri="{FF2B5EF4-FFF2-40B4-BE49-F238E27FC236}">
+                    <a16:creationId xmlns:a16="http://schemas.microsoft.com/office/drawing/2014/main" id="{C3362A29-FDC3-EB4F-8C24-308E66C24895}"/>
+                  </a:ext>
+                </a:extLst>
+              </p:cNvPr>
+              <p:cNvSpPr txBox="1">
+                <a:spLocks noRot="1" noChangeAspect="1" noMove="1" noResize="1" noEditPoints="1" noAdjustHandles="1" noChangeArrowheads="1" noChangeShapeType="1" noTextEdit="1"/>
+              </p:cNvSpPr>
+              <p:nvPr/>
+            </p:nvSpPr>
+            <p:spPr>
+              <a:xfrm>
+                <a:off x="6298400" y="2340560"/>
+                <a:ext cx="3587392" cy="1833387"/>
+              </a:xfrm>
+              <a:prstGeom prst="rect">
+                <a:avLst/>
+              </a:prstGeom>
+              <a:blipFill>
+                <a:blip r:embed="rId4"/>
+                <a:stretch>
+                  <a:fillRect l="-352" b="-2759"/>
+                </a:stretch>
+              </a:blipFill>
+            </p:spPr>
+            <p:txBody>
+              <a:bodyPr/>
+              <a:lstStyle/>
+              <a:p>
+                <a:r>
+                  <a:rPr lang="en-GB">
+                    <a:noFill/>
+                  </a:rPr>
+                  <a:t> </a:t>
+                </a:r>
+              </a:p>
+            </p:txBody>
+          </p:sp>
+        </mc:Fallback>
+      </mc:AlternateContent>
     </p:spTree>
     <p:extLst>
       <p:ext uri="{BB962C8B-B14F-4D97-AF65-F5344CB8AC3E}">

</xml_diff>